<commit_message>
Update after the mock - part 1
</commit_message>
<xml_diff>
--- a/preliminary/Working/presentations/KeyStone Peripherals Usage.pptx
+++ b/preliminary/Working/presentations/KeyStone Peripherals Usage.pptx
@@ -281,7 +281,7 @@
             <a:fld id="{1C3526D4-8A6A-409C-ABC5-6D20370EAC8E}" type="datetimeFigureOut">
               <a:rPr lang="en-US" smtClean="0"/>
               <a:pPr/>
-              <a:t>4/23/2013</a:t>
+              <a:t>4/26/2013</a:t>
             </a:fld>
             <a:endParaRPr lang="en-US" dirty="0"/>
           </a:p>
@@ -1909,7 +1909,7 @@
             <a:fld id="{191C8BB2-BC7F-4186-8F3C-FBF27B2BB72D}" type="datetimeFigureOut">
               <a:rPr lang="en-US" smtClean="0"/>
               <a:pPr/>
-              <a:t>4/23/2013</a:t>
+              <a:t>4/26/2013</a:t>
             </a:fld>
             <a:endParaRPr lang="en-US" dirty="0"/>
           </a:p>
@@ -2076,7 +2076,7 @@
             <a:fld id="{191C8BB2-BC7F-4186-8F3C-FBF27B2BB72D}" type="datetimeFigureOut">
               <a:rPr lang="en-US" smtClean="0"/>
               <a:pPr/>
-              <a:t>4/23/2013</a:t>
+              <a:t>4/26/2013</a:t>
             </a:fld>
             <a:endParaRPr lang="en-US" dirty="0"/>
           </a:p>
@@ -2253,7 +2253,7 @@
             <a:fld id="{191C8BB2-BC7F-4186-8F3C-FBF27B2BB72D}" type="datetimeFigureOut">
               <a:rPr lang="en-US" smtClean="0"/>
               <a:pPr/>
-              <a:t>4/23/2013</a:t>
+              <a:t>4/26/2013</a:t>
             </a:fld>
             <a:endParaRPr lang="en-US" dirty="0"/>
           </a:p>
@@ -2420,7 +2420,7 @@
             <a:fld id="{191C8BB2-BC7F-4186-8F3C-FBF27B2BB72D}" type="datetimeFigureOut">
               <a:rPr lang="en-US" smtClean="0"/>
               <a:pPr/>
-              <a:t>4/23/2013</a:t>
+              <a:t>4/26/2013</a:t>
             </a:fld>
             <a:endParaRPr lang="en-US" dirty="0"/>
           </a:p>
@@ -2663,7 +2663,7 @@
             <a:fld id="{191C8BB2-BC7F-4186-8F3C-FBF27B2BB72D}" type="datetimeFigureOut">
               <a:rPr lang="en-US" smtClean="0"/>
               <a:pPr/>
-              <a:t>4/23/2013</a:t>
+              <a:t>4/26/2013</a:t>
             </a:fld>
             <a:endParaRPr lang="en-US" dirty="0"/>
           </a:p>
@@ -2948,7 +2948,7 @@
             <a:fld id="{191C8BB2-BC7F-4186-8F3C-FBF27B2BB72D}" type="datetimeFigureOut">
               <a:rPr lang="en-US" smtClean="0"/>
               <a:pPr/>
-              <a:t>4/23/2013</a:t>
+              <a:t>4/26/2013</a:t>
             </a:fld>
             <a:endParaRPr lang="en-US" dirty="0"/>
           </a:p>
@@ -3367,7 +3367,7 @@
             <a:fld id="{191C8BB2-BC7F-4186-8F3C-FBF27B2BB72D}" type="datetimeFigureOut">
               <a:rPr lang="en-US" smtClean="0"/>
               <a:pPr/>
-              <a:t>4/23/2013</a:t>
+              <a:t>4/26/2013</a:t>
             </a:fld>
             <a:endParaRPr lang="en-US" dirty="0"/>
           </a:p>
@@ -3482,7 +3482,7 @@
             <a:fld id="{191C8BB2-BC7F-4186-8F3C-FBF27B2BB72D}" type="datetimeFigureOut">
               <a:rPr lang="en-US" smtClean="0"/>
               <a:pPr/>
-              <a:t>4/23/2013</a:t>
+              <a:t>4/26/2013</a:t>
             </a:fld>
             <a:endParaRPr lang="en-US" dirty="0"/>
           </a:p>
@@ -3574,7 +3574,7 @@
             <a:fld id="{191C8BB2-BC7F-4186-8F3C-FBF27B2BB72D}" type="datetimeFigureOut">
               <a:rPr lang="en-US" smtClean="0"/>
               <a:pPr/>
-              <a:t>4/23/2013</a:t>
+              <a:t>4/26/2013</a:t>
             </a:fld>
             <a:endParaRPr lang="en-US" dirty="0"/>
           </a:p>
@@ -3848,7 +3848,7 @@
             <a:fld id="{191C8BB2-BC7F-4186-8F3C-FBF27B2BB72D}" type="datetimeFigureOut">
               <a:rPr lang="en-US" smtClean="0"/>
               <a:pPr/>
-              <a:t>4/23/2013</a:t>
+              <a:t>4/26/2013</a:t>
             </a:fld>
             <a:endParaRPr lang="en-US" dirty="0"/>
           </a:p>
@@ -4098,7 +4098,7 @@
             <a:fld id="{191C8BB2-BC7F-4186-8F3C-FBF27B2BB72D}" type="datetimeFigureOut">
               <a:rPr lang="en-US" smtClean="0"/>
               <a:pPr/>
-              <a:t>4/23/2013</a:t>
+              <a:t>4/26/2013</a:t>
             </a:fld>
             <a:endParaRPr lang="en-US" dirty="0"/>
           </a:p>
@@ -4308,7 +4308,7 @@
             <a:fld id="{191C8BB2-BC7F-4186-8F3C-FBF27B2BB72D}" type="datetimeFigureOut">
               <a:rPr lang="en-US" smtClean="0"/>
               <a:pPr/>
-              <a:t>4/23/2013</a:t>
+              <a:t>4/26/2013</a:t>
             </a:fld>
             <a:endParaRPr lang="en-US" dirty="0"/>
           </a:p>
@@ -4886,7 +4886,7 @@
               <a:pPr>
                 <a:defRPr/>
               </a:pPr>
-              <a:t>4/23/2013</a:t>
+              <a:t>4/26/2013</a:t>
             </a:fld>
             <a:endParaRPr lang="en-US" dirty="0"/>
           </a:p>
@@ -5139,7 +5139,7 @@
               <a:pPr>
                 <a:defRPr/>
               </a:pPr>
-              <a:t>4/23/2013</a:t>
+              <a:t>4/26/2013</a:t>
             </a:fld>
             <a:endParaRPr lang="en-US" dirty="0"/>
           </a:p>
@@ -7208,7 +7208,7 @@
               <a:pPr>
                 <a:defRPr/>
               </a:pPr>
-              <a:t>4/23/2013</a:t>
+              <a:t>4/26/2013</a:t>
             </a:fld>
             <a:endParaRPr lang="en-US" dirty="0"/>
           </a:p>
@@ -7414,7 +7414,7 @@
               <a:pPr>
                 <a:defRPr/>
               </a:pPr>
-              <a:t>4/23/2013</a:t>
+              <a:t>4/26/2013</a:t>
             </a:fld>
             <a:endParaRPr lang="en-US" dirty="0"/>
           </a:p>
@@ -7638,7 +7638,7 @@
               <a:pPr>
                 <a:defRPr/>
               </a:pPr>
-              <a:t>4/23/2013</a:t>
+              <a:t>4/26/2013</a:t>
             </a:fld>
             <a:endParaRPr lang="en-US" dirty="0"/>
           </a:p>
@@ -7866,7 +7866,7 @@
               <a:pPr>
                 <a:defRPr/>
               </a:pPr>
-              <a:t>4/23/2013</a:t>
+              <a:t>4/26/2013</a:t>
             </a:fld>
             <a:endParaRPr lang="en-US" dirty="0"/>
           </a:p>
@@ -7978,7 +7978,7 @@
               <a:pPr>
                 <a:defRPr/>
               </a:pPr>
-              <a:t>4/23/2013</a:t>
+              <a:t>4/26/2013</a:t>
             </a:fld>
             <a:endParaRPr lang="en-US" dirty="0"/>
           </a:p>
@@ -11864,7 +11864,7 @@
               <a:pPr>
                 <a:defRPr/>
               </a:pPr>
-              <a:t>4/23/2013</a:t>
+              <a:t>4/26/2013</a:t>
             </a:fld>
             <a:endParaRPr lang="en-US" dirty="0"/>
           </a:p>
@@ -12404,7 +12404,7 @@
               <a:pPr>
                 <a:defRPr/>
               </a:pPr>
-              <a:t>4/23/2013</a:t>
+              <a:t>4/26/2013</a:t>
             </a:fld>
             <a:endParaRPr lang="en-US" dirty="0"/>
           </a:p>
@@ -13964,7 +13964,7 @@
               <a:pPr>
                 <a:defRPr/>
               </a:pPr>
-              <a:t>4/23/2013</a:t>
+              <a:t>4/26/2013</a:t>
             </a:fld>
             <a:endParaRPr lang="en-US" dirty="0"/>
           </a:p>
@@ -14152,7 +14152,7 @@
               <a:pPr>
                 <a:defRPr/>
               </a:pPr>
-              <a:t>4/23/2013</a:t>
+              <a:t>4/26/2013</a:t>
             </a:fld>
             <a:endParaRPr lang="en-US" dirty="0"/>
           </a:p>
@@ -14264,7 +14264,7 @@
               <a:pPr>
                 <a:defRPr/>
               </a:pPr>
-              <a:t>4/23/2013</a:t>
+              <a:t>4/26/2013</a:t>
             </a:fld>
             <a:endParaRPr lang="en-US" dirty="0"/>
           </a:p>
@@ -16632,7 +16632,7 @@
         </p:spPr>
         <p:txBody>
           <a:bodyPr vert="horz" lIns="91440" tIns="45720" rIns="91440" bIns="45720" rtlCol="0">
-            <a:normAutofit lnSpcReduction="10000"/>
+            <a:normAutofit/>
           </a:bodyPr>
           <a:lstStyle/>
           <a:p>
@@ -16701,7 +16701,7 @@
                 <a:ea typeface="+mn-ea"/>
                 <a:cs typeface="+mn-cs"/>
               </a:rPr>
-              <a:t>Simple IP and peripherals does</a:t>
+              <a:t>Simple IP and peripherals do</a:t>
             </a:r>
             <a:r>
               <a:rPr kumimoji="0" lang="en-US" sz="2800" b="0" i="0" u="none" strike="noStrike" kern="1200" cap="none" spc="0" normalizeH="0" noProof="0" dirty="0" smtClean="0">
@@ -16992,7 +16992,7 @@
           <a:p>
             <a:r>
               <a:rPr lang="en-US" sz="2800" dirty="0" smtClean="0"/>
-              <a:t>Almost all LLD are part of the platform Development Kit (PDK) part of MCSDK</a:t>
+              <a:t>Almost all LLDs are part of the platform Development Kit (PDK) part of MCSDK</a:t>
             </a:r>
           </a:p>
           <a:p>
@@ -40656,11 +40656,7 @@
           <a:p>
             <a:r>
               <a:rPr lang="en-US" sz="3600" dirty="0" smtClean="0"/>
-              <a:t>Linux </a:t>
-            </a:r>
-            <a:r>
-              <a:rPr lang="en-US" sz="3600" dirty="0" smtClean="0"/>
-              <a:t>Drivers</a:t>
+              <a:t>Linux Drivers</a:t>
             </a:r>
             <a:br>
               <a:rPr lang="en-US" sz="3600" dirty="0" smtClean="0"/>
@@ -40694,7 +40690,7 @@
         </p:spPr>
         <p:txBody>
           <a:bodyPr>
-            <a:normAutofit lnSpcReduction="10000"/>
+            <a:normAutofit/>
           </a:bodyPr>
           <a:lstStyle/>
           <a:p>
@@ -40715,16 +40711,6 @@
             <a:r>
               <a:rPr lang="en-US" sz="1800" dirty="0" smtClean="0"/>
               <a:t>Keystone IPC IRQ chip driver</a:t>
-            </a:r>
-          </a:p>
-          <a:p>
-            <a:pPr>
-              <a:buFont typeface="Wingdings" pitchFamily="2" charset="2"/>
-              <a:buChar char="q"/>
-            </a:pPr>
-            <a:r>
-              <a:rPr lang="en-US" sz="1800" dirty="0" smtClean="0"/>
-              <a:t>SMP</a:t>
             </a:r>
           </a:p>
           <a:p>
@@ -52661,7 +52647,7 @@
         <p:spPr/>
         <p:txBody>
           <a:bodyPr>
-            <a:normAutofit fontScale="92500"/>
+            <a:normAutofit fontScale="92500" lnSpcReduction="10000"/>
           </a:bodyPr>
           <a:lstStyle/>
           <a:p>
@@ -52674,8 +52660,13 @@
             <a:pPr lvl="1"/>
             <a:r>
               <a:rPr lang="en-US" dirty="0" smtClean="0"/>
-              <a:t>Protect resources from “race” conditions</a:t>
-            </a:r>
+              <a:t>Protect </a:t>
+            </a:r>
+            <a:r>
+              <a:rPr lang="en-US" dirty="0" smtClean="0"/>
+              <a:t>resources from conflict usage by multiple cores</a:t>
+            </a:r>
+            <a:endParaRPr lang="en-US" dirty="0" smtClean="0"/>
           </a:p>
           <a:p>
             <a:pPr lvl="1"/>

</xml_diff>